<commit_message>
update schedule w/ tutorial
</commit_message>
<xml_diff>
--- a/lectures/Log-Odds.pptx
+++ b/lectures/Log-Odds.pptx
@@ -5,7 +5,7 @@
     <p:sldMasterId id="2147483660" r:id="rId1"/>
   </p:sldMasterIdLst>
   <p:handoutMasterIdLst>
-    <p:handoutMasterId r:id="rId43"/>
+    <p:handoutMasterId r:id="rId49"/>
   </p:handoutMasterIdLst>
   <p:sldIdLst>
     <p:sldId id="256" r:id="rId2"/>
@@ -49,6 +49,12 @@
     <p:sldId id="296" r:id="rId40"/>
     <p:sldId id="297" r:id="rId41"/>
     <p:sldId id="298" r:id="rId42"/>
+    <p:sldId id="299" r:id="rId43"/>
+    <p:sldId id="300" r:id="rId44"/>
+    <p:sldId id="301" r:id="rId45"/>
+    <p:sldId id="302" r:id="rId46"/>
+    <p:sldId id="303" r:id="rId47"/>
+    <p:sldId id="304" r:id="rId48"/>
   </p:sldIdLst>
   <p:sldSz cx="9144000" cy="6858000" type="screen4x3"/>
   <p:notesSz cx="6858000" cy="9144000"/>
@@ -205,6 +211,12 @@
             <p14:sldId id="296"/>
             <p14:sldId id="297"/>
             <p14:sldId id="298"/>
+            <p14:sldId id="299"/>
+            <p14:sldId id="300"/>
+            <p14:sldId id="301"/>
+            <p14:sldId id="302"/>
+            <p14:sldId id="303"/>
+            <p14:sldId id="304"/>
           </p14:sldIdLst>
         </p14:section>
       </p14:sectionLst>
@@ -12174,6 +12186,838 @@
     <p:extLst>
       <p:ext uri="{BB962C8B-B14F-4D97-AF65-F5344CB8AC3E}">
         <p14:creationId xmlns:p14="http://schemas.microsoft.com/office/powerpoint/2010/main" val="185206657"/>
+      </p:ext>
+    </p:extLst>
+  </p:cSld>
+  <p:clrMapOvr>
+    <a:masterClrMapping/>
+  </p:clrMapOvr>
+</p:sld>
+</file>
+
+<file path=ppt/slides/slide42.xml><?xml version="1.0" encoding="utf-8"?>
+<p:sld xmlns:a="http://schemas.openxmlformats.org/drawingml/2006/main" xmlns:r="http://schemas.openxmlformats.org/officeDocument/2006/relationships" xmlns:p="http://schemas.openxmlformats.org/presentationml/2006/main">
+  <p:cSld>
+    <p:spTree>
+      <p:nvGrpSpPr>
+        <p:cNvPr id="1" name=""/>
+        <p:cNvGrpSpPr/>
+        <p:nvPr/>
+      </p:nvGrpSpPr>
+      <p:grpSpPr>
+        <a:xfrm>
+          <a:off x="0" y="0"/>
+          <a:ext cx="0" cy="0"/>
+          <a:chOff x="0" y="0"/>
+          <a:chExt cx="0" cy="0"/>
+        </a:xfrm>
+      </p:grpSpPr>
+      <p:sp>
+        <p:nvSpPr>
+          <p:cNvPr id="2" name="Title 1">
+            <a:extLst>
+              <a:ext uri="{FF2B5EF4-FFF2-40B4-BE49-F238E27FC236}">
+                <a16:creationId xmlns:a16="http://schemas.microsoft.com/office/drawing/2014/main" id="{D0973984-F841-7306-D766-AD2F20C0FF49}"/>
+              </a:ext>
+            </a:extLst>
+          </p:cNvPr>
+          <p:cNvSpPr>
+            <a:spLocks noGrp="1"/>
+          </p:cNvSpPr>
+          <p:nvPr>
+            <p:ph type="title"/>
+          </p:nvPr>
+        </p:nvSpPr>
+        <p:spPr/>
+        <p:txBody>
+          <a:bodyPr>
+            <a:noAutofit/>
+          </a:bodyPr>
+          <a:lstStyle/>
+          <a:p>
+            <a:r>
+              <a:rPr lang="en-CA" sz="3200" dirty="0"/>
+              <a:t>Example: Attitudes toward corporal punishment</a:t>
+            </a:r>
+          </a:p>
+        </p:txBody>
+      </p:sp>
+      <p:sp>
+        <p:nvSpPr>
+          <p:cNvPr id="3" name="Slide Number Placeholder 2">
+            <a:extLst>
+              <a:ext uri="{FF2B5EF4-FFF2-40B4-BE49-F238E27FC236}">
+                <a16:creationId xmlns:a16="http://schemas.microsoft.com/office/drawing/2014/main" id="{9C5B575E-999C-8FFE-2F30-AF33BE1BB271}"/>
+              </a:ext>
+            </a:extLst>
+          </p:cNvPr>
+          <p:cNvSpPr>
+            <a:spLocks noGrp="1"/>
+          </p:cNvSpPr>
+          <p:nvPr>
+            <p:ph type="sldNum" sz="quarter" idx="12"/>
+          </p:nvPr>
+        </p:nvSpPr>
+        <p:spPr/>
+        <p:txBody>
+          <a:bodyPr/>
+          <a:lstStyle/>
+          <a:p>
+            <a:fld id="{621225AB-15B9-4C79-A121-04D1DC7E2307}" type="slidenum">
+              <a:rPr lang="en-US" smtClean="0"/>
+              <a:t>42</a:t>
+            </a:fld>
+            <a:endParaRPr lang="en-US"/>
+          </a:p>
+        </p:txBody>
+      </p:sp>
+      <p:pic>
+        <p:nvPicPr>
+          <p:cNvPr id="5" name="Picture 4">
+            <a:extLst>
+              <a:ext uri="{FF2B5EF4-FFF2-40B4-BE49-F238E27FC236}">
+                <a16:creationId xmlns:a16="http://schemas.microsoft.com/office/drawing/2014/main" id="{318DD070-4B0A-0D18-5CDE-87DC3A1DD6BF}"/>
+              </a:ext>
+            </a:extLst>
+          </p:cNvPr>
+          <p:cNvPicPr>
+            <a:picLocks noChangeAspect="1"/>
+          </p:cNvPicPr>
+          <p:nvPr/>
+        </p:nvPicPr>
+        <p:blipFill>
+          <a:blip r:embed="rId2"/>
+          <a:stretch>
+            <a:fillRect/>
+          </a:stretch>
+        </p:blipFill>
+        <p:spPr>
+          <a:xfrm>
+            <a:off x="557714" y="1386143"/>
+            <a:ext cx="8028571" cy="4085714"/>
+          </a:xfrm>
+          <a:prstGeom prst="rect">
+            <a:avLst/>
+          </a:prstGeom>
+        </p:spPr>
+      </p:pic>
+    </p:spTree>
+    <p:extLst>
+      <p:ext uri="{BB962C8B-B14F-4D97-AF65-F5344CB8AC3E}">
+        <p14:creationId xmlns:p14="http://schemas.microsoft.com/office/powerpoint/2010/main" val="3035694652"/>
+      </p:ext>
+    </p:extLst>
+  </p:cSld>
+  <p:clrMapOvr>
+    <a:masterClrMapping/>
+  </p:clrMapOvr>
+</p:sld>
+</file>
+
+<file path=ppt/slides/slide43.xml><?xml version="1.0" encoding="utf-8"?>
+<p:sld xmlns:a="http://schemas.openxmlformats.org/drawingml/2006/main" xmlns:r="http://schemas.openxmlformats.org/officeDocument/2006/relationships" xmlns:p="http://schemas.openxmlformats.org/presentationml/2006/main">
+  <p:cSld>
+    <p:spTree>
+      <p:nvGrpSpPr>
+        <p:cNvPr id="1" name=""/>
+        <p:cNvGrpSpPr/>
+        <p:nvPr/>
+      </p:nvGrpSpPr>
+      <p:grpSpPr>
+        <a:xfrm>
+          <a:off x="0" y="0"/>
+          <a:ext cx="0" cy="0"/>
+          <a:chOff x="0" y="0"/>
+          <a:chExt cx="0" cy="0"/>
+        </a:xfrm>
+      </p:grpSpPr>
+      <p:sp>
+        <p:nvSpPr>
+          <p:cNvPr id="2" name="Title 1">
+            <a:extLst>
+              <a:ext uri="{FF2B5EF4-FFF2-40B4-BE49-F238E27FC236}">
+                <a16:creationId xmlns:a16="http://schemas.microsoft.com/office/drawing/2014/main" id="{8F3DDA7B-A5CB-D814-7CE4-BDF4E04DD613}"/>
+              </a:ext>
+            </a:extLst>
+          </p:cNvPr>
+          <p:cNvSpPr>
+            <a:spLocks noGrp="1"/>
+          </p:cNvSpPr>
+          <p:nvPr>
+            <p:ph type="title"/>
+          </p:nvPr>
+        </p:nvSpPr>
+        <p:spPr/>
+        <p:txBody>
+          <a:bodyPr>
+            <a:normAutofit fontScale="90000"/>
+          </a:bodyPr>
+          <a:lstStyle/>
+          <a:p>
+            <a:r>
+              <a:rPr lang="en-CA" dirty="0"/>
+              <a:t>Attitudes: Questions</a:t>
+            </a:r>
+          </a:p>
+        </p:txBody>
+      </p:sp>
+      <p:sp>
+        <p:nvSpPr>
+          <p:cNvPr id="3" name="Slide Number Placeholder 2">
+            <a:extLst>
+              <a:ext uri="{FF2B5EF4-FFF2-40B4-BE49-F238E27FC236}">
+                <a16:creationId xmlns:a16="http://schemas.microsoft.com/office/drawing/2014/main" id="{541E8907-EF0A-4493-14D7-05D41A8B3570}"/>
+              </a:ext>
+            </a:extLst>
+          </p:cNvPr>
+          <p:cNvSpPr>
+            <a:spLocks noGrp="1"/>
+          </p:cNvSpPr>
+          <p:nvPr>
+            <p:ph type="sldNum" sz="quarter" idx="12"/>
+          </p:nvPr>
+        </p:nvSpPr>
+        <p:spPr/>
+        <p:txBody>
+          <a:bodyPr/>
+          <a:lstStyle/>
+          <a:p>
+            <a:fld id="{621225AB-15B9-4C79-A121-04D1DC7E2307}" type="slidenum">
+              <a:rPr lang="en-US" smtClean="0"/>
+              <a:t>43</a:t>
+            </a:fld>
+            <a:endParaRPr lang="en-US"/>
+          </a:p>
+        </p:txBody>
+      </p:sp>
+      <p:pic>
+        <p:nvPicPr>
+          <p:cNvPr id="5" name="Picture 4">
+            <a:extLst>
+              <a:ext uri="{FF2B5EF4-FFF2-40B4-BE49-F238E27FC236}">
+                <a16:creationId xmlns:a16="http://schemas.microsoft.com/office/drawing/2014/main" id="{32D66CD9-BC8C-E30B-EC21-B7C60D64C516}"/>
+              </a:ext>
+            </a:extLst>
+          </p:cNvPr>
+          <p:cNvPicPr>
+            <a:picLocks noChangeAspect="1"/>
+          </p:cNvPicPr>
+          <p:nvPr/>
+        </p:nvPicPr>
+        <p:blipFill>
+          <a:blip r:embed="rId2"/>
+          <a:stretch>
+            <a:fillRect/>
+          </a:stretch>
+        </p:blipFill>
+        <p:spPr>
+          <a:xfrm>
+            <a:off x="486286" y="1371600"/>
+            <a:ext cx="8171428" cy="2038095"/>
+          </a:xfrm>
+          <a:prstGeom prst="rect">
+            <a:avLst/>
+          </a:prstGeom>
+        </p:spPr>
+      </p:pic>
+      <p:pic>
+        <p:nvPicPr>
+          <p:cNvPr id="7" name="Picture 6">
+            <a:extLst>
+              <a:ext uri="{FF2B5EF4-FFF2-40B4-BE49-F238E27FC236}">
+                <a16:creationId xmlns:a16="http://schemas.microsoft.com/office/drawing/2014/main" id="{01E0DF96-C81A-1E30-E196-525D183D80D8}"/>
+              </a:ext>
+            </a:extLst>
+          </p:cNvPr>
+          <p:cNvPicPr>
+            <a:picLocks noChangeAspect="1"/>
+          </p:cNvPicPr>
+          <p:nvPr/>
+        </p:nvPicPr>
+        <p:blipFill>
+          <a:blip r:embed="rId3"/>
+          <a:stretch>
+            <a:fillRect/>
+          </a:stretch>
+        </p:blipFill>
+        <p:spPr>
+          <a:xfrm>
+            <a:off x="486286" y="3733943"/>
+            <a:ext cx="8171428" cy="1142857"/>
+          </a:xfrm>
+          <a:prstGeom prst="rect">
+            <a:avLst/>
+          </a:prstGeom>
+        </p:spPr>
+      </p:pic>
+      <p:sp>
+        <p:nvSpPr>
+          <p:cNvPr id="8" name="TextBox 7">
+            <a:extLst>
+              <a:ext uri="{FF2B5EF4-FFF2-40B4-BE49-F238E27FC236}">
+                <a16:creationId xmlns:a16="http://schemas.microsoft.com/office/drawing/2014/main" id="{43DEFEB0-1B73-569F-7524-022F627FC082}"/>
+              </a:ext>
+            </a:extLst>
+          </p:cNvPr>
+          <p:cNvSpPr txBox="1"/>
+          <p:nvPr/>
+        </p:nvSpPr>
+        <p:spPr>
+          <a:xfrm>
+            <a:off x="3048000" y="2888361"/>
+            <a:ext cx="275714" cy="369332"/>
+          </a:xfrm>
+          <a:prstGeom prst="rect">
+            <a:avLst/>
+          </a:prstGeom>
+          <a:noFill/>
+        </p:spPr>
+        <p:txBody>
+          <a:bodyPr wrap="square" rtlCol="0">
+            <a:spAutoFit/>
+          </a:bodyPr>
+          <a:lstStyle/>
+          <a:p>
+            <a:r>
+              <a:rPr lang="en-CA" dirty="0"/>
+              <a:t>~</a:t>
+            </a:r>
+          </a:p>
+        </p:txBody>
+      </p:sp>
+    </p:spTree>
+    <p:extLst>
+      <p:ext uri="{BB962C8B-B14F-4D97-AF65-F5344CB8AC3E}">
+        <p14:creationId xmlns:p14="http://schemas.microsoft.com/office/powerpoint/2010/main" val="2753830946"/>
+      </p:ext>
+    </p:extLst>
+  </p:cSld>
+  <p:clrMapOvr>
+    <a:masterClrMapping/>
+  </p:clrMapOvr>
+</p:sld>
+</file>
+
+<file path=ppt/slides/slide44.xml><?xml version="1.0" encoding="utf-8"?>
+<p:sld xmlns:a="http://schemas.openxmlformats.org/drawingml/2006/main" xmlns:r="http://schemas.openxmlformats.org/officeDocument/2006/relationships" xmlns:p="http://schemas.openxmlformats.org/presentationml/2006/main">
+  <p:cSld>
+    <p:spTree>
+      <p:nvGrpSpPr>
+        <p:cNvPr id="1" name=""/>
+        <p:cNvGrpSpPr/>
+        <p:nvPr/>
+      </p:nvGrpSpPr>
+      <p:grpSpPr>
+        <a:xfrm>
+          <a:off x="0" y="0"/>
+          <a:ext cx="0" cy="0"/>
+          <a:chOff x="0" y="0"/>
+          <a:chExt cx="0" cy="0"/>
+        </a:xfrm>
+      </p:grpSpPr>
+      <p:sp>
+        <p:nvSpPr>
+          <p:cNvPr id="2" name="Title 1">
+            <a:extLst>
+              <a:ext uri="{FF2B5EF4-FFF2-40B4-BE49-F238E27FC236}">
+                <a16:creationId xmlns:a16="http://schemas.microsoft.com/office/drawing/2014/main" id="{A3731BB6-BE2A-7D4C-BB82-380EB29C9B5F}"/>
+              </a:ext>
+            </a:extLst>
+          </p:cNvPr>
+          <p:cNvSpPr>
+            <a:spLocks noGrp="1"/>
+          </p:cNvSpPr>
+          <p:nvPr>
+            <p:ph type="title"/>
+          </p:nvPr>
+        </p:nvSpPr>
+        <p:spPr/>
+        <p:txBody>
+          <a:bodyPr>
+            <a:normAutofit fontScale="90000"/>
+          </a:bodyPr>
+          <a:lstStyle/>
+          <a:p>
+            <a:r>
+              <a:rPr lang="en-CA" dirty="0"/>
+              <a:t>Log odds model for attitude</a:t>
+            </a:r>
+          </a:p>
+        </p:txBody>
+      </p:sp>
+      <p:sp>
+        <p:nvSpPr>
+          <p:cNvPr id="3" name="Slide Number Placeholder 2">
+            <a:extLst>
+              <a:ext uri="{FF2B5EF4-FFF2-40B4-BE49-F238E27FC236}">
+                <a16:creationId xmlns:a16="http://schemas.microsoft.com/office/drawing/2014/main" id="{B8953C22-9200-7696-F55D-FC3E28E4EEF2}"/>
+              </a:ext>
+            </a:extLst>
+          </p:cNvPr>
+          <p:cNvSpPr>
+            <a:spLocks noGrp="1"/>
+          </p:cNvSpPr>
+          <p:nvPr>
+            <p:ph type="sldNum" sz="quarter" idx="12"/>
+          </p:nvPr>
+        </p:nvSpPr>
+        <p:spPr/>
+        <p:txBody>
+          <a:bodyPr/>
+          <a:lstStyle/>
+          <a:p>
+            <a:fld id="{621225AB-15B9-4C79-A121-04D1DC7E2307}" type="slidenum">
+              <a:rPr lang="en-US" smtClean="0"/>
+              <a:t>44</a:t>
+            </a:fld>
+            <a:endParaRPr lang="en-US"/>
+          </a:p>
+        </p:txBody>
+      </p:sp>
+      <p:pic>
+        <p:nvPicPr>
+          <p:cNvPr id="5" name="Picture 4">
+            <a:extLst>
+              <a:ext uri="{FF2B5EF4-FFF2-40B4-BE49-F238E27FC236}">
+                <a16:creationId xmlns:a16="http://schemas.microsoft.com/office/drawing/2014/main" id="{F4E8600E-A344-F356-0850-411B512258F9}"/>
+              </a:ext>
+            </a:extLst>
+          </p:cNvPr>
+          <p:cNvPicPr>
+            <a:picLocks noChangeAspect="1"/>
+          </p:cNvPicPr>
+          <p:nvPr/>
+        </p:nvPicPr>
+        <p:blipFill>
+          <a:blip r:embed="rId2"/>
+          <a:stretch>
+            <a:fillRect/>
+          </a:stretch>
+        </p:blipFill>
+        <p:spPr>
+          <a:xfrm>
+            <a:off x="486286" y="1238524"/>
+            <a:ext cx="8171428" cy="4380952"/>
+          </a:xfrm>
+          <a:prstGeom prst="rect">
+            <a:avLst/>
+          </a:prstGeom>
+        </p:spPr>
+      </p:pic>
+    </p:spTree>
+    <p:extLst>
+      <p:ext uri="{BB962C8B-B14F-4D97-AF65-F5344CB8AC3E}">
+        <p14:creationId xmlns:p14="http://schemas.microsoft.com/office/powerpoint/2010/main" val="2334994198"/>
+      </p:ext>
+    </p:extLst>
+  </p:cSld>
+  <p:clrMapOvr>
+    <a:masterClrMapping/>
+  </p:clrMapOvr>
+</p:sld>
+</file>
+
+<file path=ppt/slides/slide45.xml><?xml version="1.0" encoding="utf-8"?>
+<p:sld xmlns:a="http://schemas.openxmlformats.org/drawingml/2006/main" xmlns:r="http://schemas.openxmlformats.org/officeDocument/2006/relationships" xmlns:p="http://schemas.openxmlformats.org/presentationml/2006/main">
+  <p:cSld>
+    <p:spTree>
+      <p:nvGrpSpPr>
+        <p:cNvPr id="1" name=""/>
+        <p:cNvGrpSpPr/>
+        <p:nvPr/>
+      </p:nvGrpSpPr>
+      <p:grpSpPr>
+        <a:xfrm>
+          <a:off x="0" y="0"/>
+          <a:ext cx="0" cy="0"/>
+          <a:chOff x="0" y="0"/>
+          <a:chExt cx="0" cy="0"/>
+        </a:xfrm>
+      </p:grpSpPr>
+      <p:sp>
+        <p:nvSpPr>
+          <p:cNvPr id="2" name="Title 1">
+            <a:extLst>
+              <a:ext uri="{FF2B5EF4-FFF2-40B4-BE49-F238E27FC236}">
+                <a16:creationId xmlns:a16="http://schemas.microsoft.com/office/drawing/2014/main" id="{C848D388-7C39-7F0B-B058-F5D2EF6BF9E7}"/>
+              </a:ext>
+            </a:extLst>
+          </p:cNvPr>
+          <p:cNvSpPr>
+            <a:spLocks noGrp="1"/>
+          </p:cNvSpPr>
+          <p:nvPr>
+            <p:ph type="title"/>
+          </p:nvPr>
+        </p:nvSpPr>
+        <p:spPr/>
+        <p:txBody>
+          <a:bodyPr>
+            <a:normAutofit fontScale="90000"/>
+          </a:bodyPr>
+          <a:lstStyle/>
+          <a:p>
+            <a:r>
+              <a:rPr lang="en-CA" dirty="0"/>
+              <a:t>Attitude: Effect plots</a:t>
+            </a:r>
+          </a:p>
+        </p:txBody>
+      </p:sp>
+      <p:sp>
+        <p:nvSpPr>
+          <p:cNvPr id="3" name="Slide Number Placeholder 2">
+            <a:extLst>
+              <a:ext uri="{FF2B5EF4-FFF2-40B4-BE49-F238E27FC236}">
+                <a16:creationId xmlns:a16="http://schemas.microsoft.com/office/drawing/2014/main" id="{DC3AAB8C-7078-584E-1C68-9192E64BD66A}"/>
+              </a:ext>
+            </a:extLst>
+          </p:cNvPr>
+          <p:cNvSpPr>
+            <a:spLocks noGrp="1"/>
+          </p:cNvSpPr>
+          <p:nvPr>
+            <p:ph type="sldNum" sz="quarter" idx="12"/>
+          </p:nvPr>
+        </p:nvSpPr>
+        <p:spPr/>
+        <p:txBody>
+          <a:bodyPr/>
+          <a:lstStyle/>
+          <a:p>
+            <a:fld id="{621225AB-15B9-4C79-A121-04D1DC7E2307}" type="slidenum">
+              <a:rPr lang="en-US" smtClean="0"/>
+              <a:t>45</a:t>
+            </a:fld>
+            <a:endParaRPr lang="en-US"/>
+          </a:p>
+        </p:txBody>
+      </p:sp>
+      <p:pic>
+        <p:nvPicPr>
+          <p:cNvPr id="5" name="Picture 4">
+            <a:extLst>
+              <a:ext uri="{FF2B5EF4-FFF2-40B4-BE49-F238E27FC236}">
+                <a16:creationId xmlns:a16="http://schemas.microsoft.com/office/drawing/2014/main" id="{1D9A9485-8610-95B6-48E9-8803F8558E99}"/>
+              </a:ext>
+            </a:extLst>
+          </p:cNvPr>
+          <p:cNvPicPr>
+            <a:picLocks noChangeAspect="1"/>
+          </p:cNvPicPr>
+          <p:nvPr/>
+        </p:nvPicPr>
+        <p:blipFill>
+          <a:blip r:embed="rId2"/>
+          <a:stretch>
+            <a:fillRect/>
+          </a:stretch>
+        </p:blipFill>
+        <p:spPr>
+          <a:xfrm>
+            <a:off x="486286" y="1429352"/>
+            <a:ext cx="8171428" cy="4819048"/>
+          </a:xfrm>
+          <a:prstGeom prst="rect">
+            <a:avLst/>
+          </a:prstGeom>
+        </p:spPr>
+      </p:pic>
+    </p:spTree>
+    <p:extLst>
+      <p:ext uri="{BB962C8B-B14F-4D97-AF65-F5344CB8AC3E}">
+        <p14:creationId xmlns:p14="http://schemas.microsoft.com/office/powerpoint/2010/main" val="3540779467"/>
+      </p:ext>
+    </p:extLst>
+  </p:cSld>
+  <p:clrMapOvr>
+    <a:masterClrMapping/>
+  </p:clrMapOvr>
+</p:sld>
+</file>
+
+<file path=ppt/slides/slide46.xml><?xml version="1.0" encoding="utf-8"?>
+<p:sld xmlns:a="http://schemas.openxmlformats.org/drawingml/2006/main" xmlns:r="http://schemas.openxmlformats.org/officeDocument/2006/relationships" xmlns:p="http://schemas.openxmlformats.org/presentationml/2006/main">
+  <p:cSld>
+    <p:spTree>
+      <p:nvGrpSpPr>
+        <p:cNvPr id="1" name=""/>
+        <p:cNvGrpSpPr/>
+        <p:nvPr/>
+      </p:nvGrpSpPr>
+      <p:grpSpPr>
+        <a:xfrm>
+          <a:off x="0" y="0"/>
+          <a:ext cx="0" cy="0"/>
+          <a:chOff x="0" y="0"/>
+          <a:chExt cx="0" cy="0"/>
+        </a:xfrm>
+      </p:grpSpPr>
+      <p:sp>
+        <p:nvSpPr>
+          <p:cNvPr id="2" name="Title 1">
+            <a:extLst>
+              <a:ext uri="{FF2B5EF4-FFF2-40B4-BE49-F238E27FC236}">
+                <a16:creationId xmlns:a16="http://schemas.microsoft.com/office/drawing/2014/main" id="{4931FA44-07EF-77B0-4D14-58ABE65D08B7}"/>
+              </a:ext>
+            </a:extLst>
+          </p:cNvPr>
+          <p:cNvSpPr>
+            <a:spLocks noGrp="1"/>
+          </p:cNvSpPr>
+          <p:nvPr>
+            <p:ph type="title"/>
+          </p:nvPr>
+        </p:nvSpPr>
+        <p:spPr/>
+        <p:txBody>
+          <a:bodyPr>
+            <a:noAutofit/>
+          </a:bodyPr>
+          <a:lstStyle/>
+          <a:p>
+            <a:r>
+              <a:rPr lang="en-CA" sz="2800" dirty="0"/>
+              <a:t>Association of attitude with memory: Fourfold plots</a:t>
+            </a:r>
+          </a:p>
+        </p:txBody>
+      </p:sp>
+      <p:sp>
+        <p:nvSpPr>
+          <p:cNvPr id="3" name="Slide Number Placeholder 2">
+            <a:extLst>
+              <a:ext uri="{FF2B5EF4-FFF2-40B4-BE49-F238E27FC236}">
+                <a16:creationId xmlns:a16="http://schemas.microsoft.com/office/drawing/2014/main" id="{A4E937CA-80DB-7068-B241-7DF1C23D43D4}"/>
+              </a:ext>
+            </a:extLst>
+          </p:cNvPr>
+          <p:cNvSpPr>
+            <a:spLocks noGrp="1"/>
+          </p:cNvSpPr>
+          <p:nvPr>
+            <p:ph type="sldNum" sz="quarter" idx="12"/>
+          </p:nvPr>
+        </p:nvSpPr>
+        <p:spPr/>
+        <p:txBody>
+          <a:bodyPr/>
+          <a:lstStyle/>
+          <a:p>
+            <a:fld id="{621225AB-15B9-4C79-A121-04D1DC7E2307}" type="slidenum">
+              <a:rPr lang="en-US" smtClean="0"/>
+              <a:t>46</a:t>
+            </a:fld>
+            <a:endParaRPr lang="en-US"/>
+          </a:p>
+        </p:txBody>
+      </p:sp>
+      <p:pic>
+        <p:nvPicPr>
+          <p:cNvPr id="5" name="Picture 4">
+            <a:extLst>
+              <a:ext uri="{FF2B5EF4-FFF2-40B4-BE49-F238E27FC236}">
+                <a16:creationId xmlns:a16="http://schemas.microsoft.com/office/drawing/2014/main" id="{DDFFB9EE-6EBD-A6BE-8DC3-2DCAB31DC772}"/>
+              </a:ext>
+            </a:extLst>
+          </p:cNvPr>
+          <p:cNvPicPr>
+            <a:picLocks noChangeAspect="1"/>
+          </p:cNvPicPr>
+          <p:nvPr/>
+        </p:nvPicPr>
+        <p:blipFill>
+          <a:blip r:embed="rId2"/>
+          <a:stretch>
+            <a:fillRect/>
+          </a:stretch>
+        </p:blipFill>
+        <p:spPr>
+          <a:xfrm>
+            <a:off x="457200" y="1292522"/>
+            <a:ext cx="4257143" cy="4761905"/>
+          </a:xfrm>
+          <a:prstGeom prst="rect">
+            <a:avLst/>
+          </a:prstGeom>
+        </p:spPr>
+      </p:pic>
+      <p:sp>
+        <p:nvSpPr>
+          <p:cNvPr id="6" name="TextBox 5">
+            <a:extLst>
+              <a:ext uri="{FF2B5EF4-FFF2-40B4-BE49-F238E27FC236}">
+                <a16:creationId xmlns:a16="http://schemas.microsoft.com/office/drawing/2014/main" id="{B56A02A5-69AE-7CE7-4775-D13DF7D02D94}"/>
+              </a:ext>
+            </a:extLst>
+          </p:cNvPr>
+          <p:cNvSpPr txBox="1"/>
+          <p:nvPr/>
+        </p:nvSpPr>
+        <p:spPr>
+          <a:xfrm>
+            <a:off x="5029200" y="1447800"/>
+            <a:ext cx="3657600" cy="2308324"/>
+          </a:xfrm>
+          <a:prstGeom prst="rect">
+            <a:avLst/>
+          </a:prstGeom>
+          <a:noFill/>
+        </p:spPr>
+        <p:txBody>
+          <a:bodyPr wrap="square" rtlCol="0">
+            <a:spAutoFit/>
+          </a:bodyPr>
+          <a:lstStyle/>
+          <a:p>
+            <a:r>
+              <a:rPr lang="en-CA" dirty="0"/>
+              <a:t>How does the association of attitude and memory vary with education and age?</a:t>
+            </a:r>
+          </a:p>
+          <a:p>
+            <a:endParaRPr lang="en-CA" dirty="0"/>
+          </a:p>
+          <a:p>
+            <a:r>
+              <a:rPr lang="en-CA" dirty="0"/>
+              <a:t>Each fourfold plot visualizes the log odds ratio between them</a:t>
+            </a:r>
+          </a:p>
+          <a:p>
+            <a:endParaRPr lang="en-CA" dirty="0"/>
+          </a:p>
+          <a:p>
+            <a:r>
+              <a:rPr lang="en-CA" dirty="0"/>
+              <a:t>What’s going on here?</a:t>
+            </a:r>
+          </a:p>
+        </p:txBody>
+      </p:sp>
+    </p:spTree>
+    <p:extLst>
+      <p:ext uri="{BB962C8B-B14F-4D97-AF65-F5344CB8AC3E}">
+        <p14:creationId xmlns:p14="http://schemas.microsoft.com/office/powerpoint/2010/main" val="4269866124"/>
+      </p:ext>
+    </p:extLst>
+  </p:cSld>
+  <p:clrMapOvr>
+    <a:masterClrMapping/>
+  </p:clrMapOvr>
+</p:sld>
+</file>
+
+<file path=ppt/slides/slide47.xml><?xml version="1.0" encoding="utf-8"?>
+<p:sld xmlns:a="http://schemas.openxmlformats.org/drawingml/2006/main" xmlns:r="http://schemas.openxmlformats.org/officeDocument/2006/relationships" xmlns:p="http://schemas.openxmlformats.org/presentationml/2006/main">
+  <p:cSld>
+    <p:spTree>
+      <p:nvGrpSpPr>
+        <p:cNvPr id="1" name=""/>
+        <p:cNvGrpSpPr/>
+        <p:nvPr/>
+      </p:nvGrpSpPr>
+      <p:grpSpPr>
+        <a:xfrm>
+          <a:off x="0" y="0"/>
+          <a:ext cx="0" cy="0"/>
+          <a:chOff x="0" y="0"/>
+          <a:chExt cx="0" cy="0"/>
+        </a:xfrm>
+      </p:grpSpPr>
+      <p:sp>
+        <p:nvSpPr>
+          <p:cNvPr id="2" name="Title 1">
+            <a:extLst>
+              <a:ext uri="{FF2B5EF4-FFF2-40B4-BE49-F238E27FC236}">
+                <a16:creationId xmlns:a16="http://schemas.microsoft.com/office/drawing/2014/main" id="{4C27168C-629E-BEDE-D9CB-EA13EBC566BD}"/>
+              </a:ext>
+            </a:extLst>
+          </p:cNvPr>
+          <p:cNvSpPr>
+            <a:spLocks noGrp="1"/>
+          </p:cNvSpPr>
+          <p:nvPr>
+            <p:ph type="title"/>
+          </p:nvPr>
+        </p:nvSpPr>
+        <p:spPr/>
+        <p:txBody>
+          <a:bodyPr>
+            <a:normAutofit fontScale="90000"/>
+          </a:bodyPr>
+          <a:lstStyle/>
+          <a:p>
+            <a:r>
+              <a:rPr lang="en-CA" dirty="0"/>
+              <a:t>Log odds ratio plot</a:t>
+            </a:r>
+          </a:p>
+        </p:txBody>
+      </p:sp>
+      <p:sp>
+        <p:nvSpPr>
+          <p:cNvPr id="3" name="Slide Number Placeholder 2">
+            <a:extLst>
+              <a:ext uri="{FF2B5EF4-FFF2-40B4-BE49-F238E27FC236}">
+                <a16:creationId xmlns:a16="http://schemas.microsoft.com/office/drawing/2014/main" id="{5E165D09-A529-0CC4-4CE3-57D3E3C67D1F}"/>
+              </a:ext>
+            </a:extLst>
+          </p:cNvPr>
+          <p:cNvSpPr>
+            <a:spLocks noGrp="1"/>
+          </p:cNvSpPr>
+          <p:nvPr>
+            <p:ph type="sldNum" sz="quarter" idx="12"/>
+          </p:nvPr>
+        </p:nvSpPr>
+        <p:spPr/>
+        <p:txBody>
+          <a:bodyPr/>
+          <a:lstStyle/>
+          <a:p>
+            <a:fld id="{621225AB-15B9-4C79-A121-04D1DC7E2307}" type="slidenum">
+              <a:rPr lang="en-US" smtClean="0"/>
+              <a:t>47</a:t>
+            </a:fld>
+            <a:endParaRPr lang="en-US"/>
+          </a:p>
+        </p:txBody>
+      </p:sp>
+      <p:pic>
+        <p:nvPicPr>
+          <p:cNvPr id="5" name="Picture 4">
+            <a:extLst>
+              <a:ext uri="{FF2B5EF4-FFF2-40B4-BE49-F238E27FC236}">
+                <a16:creationId xmlns:a16="http://schemas.microsoft.com/office/drawing/2014/main" id="{2346022A-D4A1-2D41-C0B0-EFA3B859A439}"/>
+              </a:ext>
+            </a:extLst>
+          </p:cNvPr>
+          <p:cNvPicPr>
+            <a:picLocks noChangeAspect="1"/>
+          </p:cNvPicPr>
+          <p:nvPr/>
+        </p:nvPicPr>
+        <p:blipFill>
+          <a:blip r:embed="rId2"/>
+          <a:stretch>
+            <a:fillRect/>
+          </a:stretch>
+        </p:blipFill>
+        <p:spPr>
+          <a:xfrm>
+            <a:off x="486286" y="1143000"/>
+            <a:ext cx="8171428" cy="5504762"/>
+          </a:xfrm>
+          <a:prstGeom prst="rect">
+            <a:avLst/>
+          </a:prstGeom>
+        </p:spPr>
+      </p:pic>
+    </p:spTree>
+    <p:extLst>
+      <p:ext uri="{BB962C8B-B14F-4D97-AF65-F5344CB8AC3E}">
+        <p14:creationId xmlns:p14="http://schemas.microsoft.com/office/powerpoint/2010/main" val="1557461102"/>
       </p:ext>
     </p:extLst>
   </p:cSld>

</xml_diff>